<commit_message>
small improvements to slides
</commit_message>
<xml_diff>
--- a/slides_lore.pptx
+++ b/slides_lore.pptx
@@ -9,18 +9,19 @@
     <p:sldId id="257" r:id="rId3"/>
     <p:sldId id="258" r:id="rId4"/>
     <p:sldId id="259" r:id="rId5"/>
-    <p:sldId id="266" r:id="rId6"/>
-    <p:sldId id="268" r:id="rId7"/>
-    <p:sldId id="269" r:id="rId8"/>
-    <p:sldId id="270" r:id="rId9"/>
-    <p:sldId id="260" r:id="rId10"/>
-    <p:sldId id="271" r:id="rId11"/>
-    <p:sldId id="272" r:id="rId12"/>
-    <p:sldId id="267" r:id="rId13"/>
-    <p:sldId id="273" r:id="rId14"/>
-    <p:sldId id="261" r:id="rId15"/>
-    <p:sldId id="263" r:id="rId16"/>
-    <p:sldId id="262" r:id="rId17"/>
+    <p:sldId id="274" r:id="rId6"/>
+    <p:sldId id="266" r:id="rId7"/>
+    <p:sldId id="268" r:id="rId8"/>
+    <p:sldId id="269" r:id="rId9"/>
+    <p:sldId id="270" r:id="rId10"/>
+    <p:sldId id="260" r:id="rId11"/>
+    <p:sldId id="271" r:id="rId12"/>
+    <p:sldId id="272" r:id="rId13"/>
+    <p:sldId id="267" r:id="rId14"/>
+    <p:sldId id="273" r:id="rId15"/>
+    <p:sldId id="261" r:id="rId16"/>
+    <p:sldId id="263" r:id="rId17"/>
+    <p:sldId id="262" r:id="rId18"/>
   </p:sldIdLst>
   <p:sldSz cx="12192000" cy="6858000"/>
   <p:notesSz cx="6858000" cy="9144000"/>
@@ -3433,6 +3434,279 @@
   <p:cSld>
     <p:spTree>
       <p:nvGrpSpPr>
+        <p:cNvPr id="1" name="">
+          <a:extLst>
+            <a:ext uri="{FF2B5EF4-FFF2-40B4-BE49-F238E27FC236}">
+              <a16:creationId xmlns:a16="http://schemas.microsoft.com/office/drawing/2014/main" id="{9A366319-88FC-7D3A-1B58-E12CEB3C5B51}"/>
+            </a:ext>
+          </a:extLst>
+        </p:cNvPr>
+        <p:cNvGrpSpPr/>
+        <p:nvPr/>
+      </p:nvGrpSpPr>
+      <p:grpSpPr>
+        <a:xfrm>
+          <a:off x="0" y="0"/>
+          <a:ext cx="0" cy="0"/>
+          <a:chOff x="0" y="0"/>
+          <a:chExt cx="0" cy="0"/>
+        </a:xfrm>
+      </p:grpSpPr>
+      <p:sp>
+        <p:nvSpPr>
+          <p:cNvPr id="2" name="Title 1">
+            <a:extLst>
+              <a:ext uri="{FF2B5EF4-FFF2-40B4-BE49-F238E27FC236}">
+                <a16:creationId xmlns:a16="http://schemas.microsoft.com/office/drawing/2014/main" id="{ABC50D5E-AEE0-E054-831D-B16DF43E3E6A}"/>
+              </a:ext>
+            </a:extLst>
+          </p:cNvPr>
+          <p:cNvSpPr>
+            <a:spLocks noGrp="1"/>
+          </p:cNvSpPr>
+          <p:nvPr>
+            <p:ph type="title"/>
+          </p:nvPr>
+        </p:nvSpPr>
+        <p:spPr/>
+        <p:txBody>
+          <a:bodyPr/>
+          <a:lstStyle/>
+          <a:p>
+            <a:r>
+              <a:rPr lang="en-BE" dirty="0"/>
+              <a:t>Estimating the waiting times</a:t>
+            </a:r>
+          </a:p>
+        </p:txBody>
+      </p:sp>
+      <p:sp>
+        <p:nvSpPr>
+          <p:cNvPr id="3" name="Content Placeholder 2">
+            <a:extLst>
+              <a:ext uri="{FF2B5EF4-FFF2-40B4-BE49-F238E27FC236}">
+                <a16:creationId xmlns:a16="http://schemas.microsoft.com/office/drawing/2014/main" id="{F27E63B8-DA9C-5431-E1E5-FF46351E185A}"/>
+              </a:ext>
+            </a:extLst>
+          </p:cNvPr>
+          <p:cNvSpPr>
+            <a:spLocks noGrp="1"/>
+          </p:cNvSpPr>
+          <p:nvPr>
+            <p:ph idx="1"/>
+          </p:nvPr>
+        </p:nvSpPr>
+        <p:spPr/>
+        <p:txBody>
+          <a:bodyPr/>
+          <a:lstStyle/>
+          <a:p>
+            <a:endParaRPr lang="en-BE" dirty="0"/>
+          </a:p>
+          <a:p>
+            <a:endParaRPr lang="en-BE" dirty="0"/>
+          </a:p>
+          <a:p>
+            <a:endParaRPr lang="en-BE" dirty="0"/>
+          </a:p>
+        </p:txBody>
+      </p:sp>
+      <p:sp>
+        <p:nvSpPr>
+          <p:cNvPr id="4" name="Rounded Rectangle 3">
+            <a:extLst>
+              <a:ext uri="{FF2B5EF4-FFF2-40B4-BE49-F238E27FC236}">
+                <a16:creationId xmlns:a16="http://schemas.microsoft.com/office/drawing/2014/main" id="{96E28FE9-3A53-F6EF-76BA-06398A3BF7A0}"/>
+              </a:ext>
+            </a:extLst>
+          </p:cNvPr>
+          <p:cNvSpPr/>
+          <p:nvPr/>
+        </p:nvSpPr>
+        <p:spPr>
+          <a:xfrm>
+            <a:off x="671513" y="2120900"/>
+            <a:ext cx="3128962" cy="3760788"/>
+          </a:xfrm>
+          <a:prstGeom prst="roundRect">
+            <a:avLst/>
+          </a:prstGeom>
+          <a:solidFill>
+            <a:schemeClr val="accent1">
+              <a:lumMod val="20000"/>
+              <a:lumOff val="80000"/>
+            </a:schemeClr>
+          </a:solidFill>
+          <a:ln>
+            <a:noFill/>
+          </a:ln>
+        </p:spPr>
+        <p:style>
+          <a:lnRef idx="2">
+            <a:schemeClr val="accent1">
+              <a:shade val="15000"/>
+            </a:schemeClr>
+          </a:lnRef>
+          <a:fillRef idx="1">
+            <a:schemeClr val="accent1"/>
+          </a:fillRef>
+          <a:effectRef idx="0">
+            <a:schemeClr val="accent1"/>
+          </a:effectRef>
+          <a:fontRef idx="minor">
+            <a:schemeClr val="lt1"/>
+          </a:fontRef>
+        </p:style>
+        <p:txBody>
+          <a:bodyPr rtlCol="0" anchor="ctr"/>
+          <a:lstStyle/>
+          <a:p>
+            <a:pPr algn="ctr"/>
+            <a:r>
+              <a:rPr lang="en-BE" dirty="0">
+                <a:solidFill>
+                  <a:schemeClr val="tx1"/>
+                </a:solidFill>
+              </a:rPr>
+              <a:t>Ratio actual over posted</a:t>
+            </a:r>
+          </a:p>
+        </p:txBody>
+      </p:sp>
+      <p:sp>
+        <p:nvSpPr>
+          <p:cNvPr id="5" name="Rounded Rectangle 4">
+            <a:extLst>
+              <a:ext uri="{FF2B5EF4-FFF2-40B4-BE49-F238E27FC236}">
+                <a16:creationId xmlns:a16="http://schemas.microsoft.com/office/drawing/2014/main" id="{CFE63623-B0C2-7FCD-FCC6-2C35523E8443}"/>
+              </a:ext>
+            </a:extLst>
+          </p:cNvPr>
+          <p:cNvSpPr/>
+          <p:nvPr/>
+        </p:nvSpPr>
+        <p:spPr>
+          <a:xfrm>
+            <a:off x="4531519" y="2120900"/>
+            <a:ext cx="3128962" cy="3760788"/>
+          </a:xfrm>
+          <a:prstGeom prst="roundRect">
+            <a:avLst/>
+          </a:prstGeom>
+          <a:solidFill>
+            <a:schemeClr val="accent3">
+              <a:lumMod val="20000"/>
+              <a:lumOff val="80000"/>
+            </a:schemeClr>
+          </a:solidFill>
+          <a:ln>
+            <a:noFill/>
+          </a:ln>
+        </p:spPr>
+        <p:style>
+          <a:lnRef idx="2">
+            <a:schemeClr val="accent1">
+              <a:shade val="15000"/>
+            </a:schemeClr>
+          </a:lnRef>
+          <a:fillRef idx="1">
+            <a:schemeClr val="accent1"/>
+          </a:fillRef>
+          <a:effectRef idx="0">
+            <a:schemeClr val="accent1"/>
+          </a:effectRef>
+          <a:fontRef idx="minor">
+            <a:schemeClr val="lt1"/>
+          </a:fontRef>
+        </p:style>
+        <p:txBody>
+          <a:bodyPr rtlCol="0" anchor="ctr"/>
+          <a:lstStyle/>
+          <a:p>
+            <a:pPr algn="ctr"/>
+            <a:r>
+              <a:rPr lang="en-BE" dirty="0">
+                <a:solidFill>
+                  <a:schemeClr val="tx1"/>
+                </a:solidFill>
+              </a:rPr>
+              <a:t>Predict ratios with model</a:t>
+            </a:r>
+          </a:p>
+        </p:txBody>
+      </p:sp>
+      <p:sp>
+        <p:nvSpPr>
+          <p:cNvPr id="8" name="Triangle 7">
+            <a:extLst>
+              <a:ext uri="{FF2B5EF4-FFF2-40B4-BE49-F238E27FC236}">
+                <a16:creationId xmlns:a16="http://schemas.microsoft.com/office/drawing/2014/main" id="{8335E6CA-79BA-97ED-C3C0-49080C2ADC37}"/>
+              </a:ext>
+            </a:extLst>
+          </p:cNvPr>
+          <p:cNvSpPr/>
+          <p:nvPr/>
+        </p:nvSpPr>
+        <p:spPr>
+          <a:xfrm rot="5400000">
+            <a:off x="3128424" y="3759817"/>
+            <a:ext cx="2075145" cy="482954"/>
+          </a:xfrm>
+          <a:prstGeom prst="triangle">
+            <a:avLst/>
+          </a:prstGeom>
+          <a:solidFill>
+            <a:schemeClr val="bg2">
+              <a:lumMod val="75000"/>
+            </a:schemeClr>
+          </a:solidFill>
+          <a:ln>
+            <a:noFill/>
+          </a:ln>
+        </p:spPr>
+        <p:style>
+          <a:lnRef idx="2">
+            <a:schemeClr val="accent1">
+              <a:shade val="15000"/>
+            </a:schemeClr>
+          </a:lnRef>
+          <a:fillRef idx="1">
+            <a:schemeClr val="accent1"/>
+          </a:fillRef>
+          <a:effectRef idx="0">
+            <a:schemeClr val="accent1"/>
+          </a:effectRef>
+          <a:fontRef idx="minor">
+            <a:schemeClr val="lt1"/>
+          </a:fontRef>
+        </p:style>
+        <p:txBody>
+          <a:bodyPr rtlCol="0" anchor="ctr"/>
+          <a:lstStyle/>
+          <a:p>
+            <a:pPr algn="ctr"/>
+            <a:endParaRPr lang="en-BE" dirty="0"/>
+          </a:p>
+        </p:txBody>
+      </p:sp>
+    </p:spTree>
+    <p:extLst>
+      <p:ext uri="{BB962C8B-B14F-4D97-AF65-F5344CB8AC3E}">
+        <p14:creationId xmlns:p14="http://schemas.microsoft.com/office/powerpoint/2010/main" val="2694800230"/>
+      </p:ext>
+    </p:extLst>
+  </p:cSld>
+  <p:clrMapOvr>
+    <a:masterClrMapping/>
+  </p:clrMapOvr>
+</p:sld>
+</file>
+
+<file path=ppt/slides/slide11.xml><?xml version="1.0" encoding="utf-8"?>
+<p:sld xmlns:a="http://schemas.openxmlformats.org/drawingml/2006/main" xmlns:r="http://schemas.openxmlformats.org/officeDocument/2006/relationships" xmlns:p="http://schemas.openxmlformats.org/presentationml/2006/main">
+  <p:cSld>
+    <p:spTree>
+      <p:nvGrpSpPr>
         <p:cNvPr id="1" name=""/>
         <p:cNvGrpSpPr/>
         <p:nvPr/>
@@ -5414,7 +5688,7 @@
 </p:sld>
 </file>
 
-<file path=ppt/slides/slide11.xml><?xml version="1.0" encoding="utf-8"?>
+<file path=ppt/slides/slide12.xml><?xml version="1.0" encoding="utf-8"?>
 <p:sld xmlns:a="http://schemas.openxmlformats.org/drawingml/2006/main" xmlns:r="http://schemas.openxmlformats.org/officeDocument/2006/relationships" xmlns:p="http://schemas.openxmlformats.org/presentationml/2006/main">
   <p:cSld>
     <p:spTree>
@@ -5518,7 +5792,7 @@
 </p:sld>
 </file>
 
-<file path=ppt/slides/slide12.xml><?xml version="1.0" encoding="utf-8"?>
+<file path=ppt/slides/slide13.xml><?xml version="1.0" encoding="utf-8"?>
 <p:sld xmlns:a="http://schemas.openxmlformats.org/drawingml/2006/main" xmlns:r="http://schemas.openxmlformats.org/officeDocument/2006/relationships" xmlns:p="http://schemas.openxmlformats.org/presentationml/2006/main">
   <p:cSld>
     <p:spTree>
@@ -5907,7 +6181,7 @@
 </p:sld>
 </file>
 
-<file path=ppt/slides/slide13.xml><?xml version="1.0" encoding="utf-8"?>
+<file path=ppt/slides/slide14.xml><?xml version="1.0" encoding="utf-8"?>
 <p:sld xmlns:a="http://schemas.openxmlformats.org/drawingml/2006/main" xmlns:r="http://schemas.openxmlformats.org/officeDocument/2006/relationships" xmlns:p="http://schemas.openxmlformats.org/presentationml/2006/main">
   <p:cSld>
     <p:spTree>
@@ -7048,7 +7322,7 @@
           <p:nvPr>
             <p:extLst>
               <p:ext uri="{D42A27DB-BD31-4B8C-83A1-F6EECF244321}">
-                <p14:modId xmlns:p14="http://schemas.microsoft.com/office/powerpoint/2010/main" val="3868366543"/>
+                <p14:modId xmlns:p14="http://schemas.microsoft.com/office/powerpoint/2010/main" val="1000199327"/>
               </p:ext>
             </p:extLst>
           </p:nvPr>
@@ -7156,7 +7430,7 @@
                           <a:ea typeface="+mn-ea"/>
                           <a:cs typeface="+mn-cs"/>
                         </a:rPr>
-                        <a:t>30.31</a:t>
+                        <a:t>3.03</a:t>
                       </a:r>
                     </a:p>
                   </a:txBody>
@@ -7403,6 +7677,99 @@
           </a:p>
         </p:txBody>
       </p:sp>
+      <p:sp>
+        <p:nvSpPr>
+          <p:cNvPr id="15" name="Right Brace 14">
+            <a:extLst>
+              <a:ext uri="{FF2B5EF4-FFF2-40B4-BE49-F238E27FC236}">
+                <a16:creationId xmlns:a16="http://schemas.microsoft.com/office/drawing/2014/main" id="{97895310-18DF-A22B-E4F1-56835BCFA1B2}"/>
+              </a:ext>
+            </a:extLst>
+          </p:cNvPr>
+          <p:cNvSpPr/>
+          <p:nvPr/>
+        </p:nvSpPr>
+        <p:spPr>
+          <a:xfrm rot="16200000">
+            <a:off x="2939691" y="-1016946"/>
+            <a:ext cx="319087" cy="5096178"/>
+          </a:xfrm>
+          <a:prstGeom prst="rightBrace">
+            <a:avLst/>
+          </a:prstGeom>
+          <a:ln w="28575"/>
+        </p:spPr>
+        <p:style>
+          <a:lnRef idx="2">
+            <a:schemeClr val="accent1"/>
+          </a:lnRef>
+          <a:fillRef idx="0">
+            <a:schemeClr val="accent1"/>
+          </a:fillRef>
+          <a:effectRef idx="1">
+            <a:schemeClr val="accent1"/>
+          </a:effectRef>
+          <a:fontRef idx="minor">
+            <a:schemeClr val="tx1"/>
+          </a:fontRef>
+        </p:style>
+        <p:txBody>
+          <a:bodyPr rtlCol="0" anchor="ctr"/>
+          <a:lstStyle/>
+          <a:p>
+            <a:pPr algn="ctr"/>
+            <a:endParaRPr lang="en-BE"/>
+          </a:p>
+        </p:txBody>
+      </p:sp>
+      <p:cxnSp>
+        <p:nvCxnSpPr>
+          <p:cNvPr id="17" name="Curved Connector 16">
+            <a:extLst>
+              <a:ext uri="{FF2B5EF4-FFF2-40B4-BE49-F238E27FC236}">
+                <a16:creationId xmlns:a16="http://schemas.microsoft.com/office/drawing/2014/main" id="{39E6867D-368A-7949-E97E-5CEBBCB94FCC}"/>
+              </a:ext>
+            </a:extLst>
+          </p:cNvPr>
+          <p:cNvCxnSpPr>
+            <a:cxnSpLocks/>
+            <a:stCxn id="15" idx="1"/>
+            <a:endCxn id="8" idx="0"/>
+          </p:cNvCxnSpPr>
+          <p:nvPr/>
+        </p:nvCxnSpPr>
+        <p:spPr>
+          <a:xfrm rot="16200000" flipH="1">
+            <a:off x="5464946" y="-994112"/>
+            <a:ext cx="319088" cy="5050511"/>
+          </a:xfrm>
+          <a:prstGeom prst="curvedConnector5">
+            <a:avLst>
+              <a:gd name="adj1" fmla="val 1"/>
+              <a:gd name="adj2" fmla="val 65074"/>
+              <a:gd name="adj3" fmla="val -2985"/>
+            </a:avLst>
+          </a:prstGeom>
+          <a:ln w="19050">
+            <a:prstDash val="sysDash"/>
+            <a:tailEnd type="triangle"/>
+          </a:ln>
+        </p:spPr>
+        <p:style>
+          <a:lnRef idx="2">
+            <a:schemeClr val="accent1"/>
+          </a:lnRef>
+          <a:fillRef idx="0">
+            <a:schemeClr val="accent1"/>
+          </a:fillRef>
+          <a:effectRef idx="1">
+            <a:schemeClr val="accent1"/>
+          </a:effectRef>
+          <a:fontRef idx="minor">
+            <a:schemeClr val="tx1"/>
+          </a:fontRef>
+        </p:style>
+      </p:cxnSp>
     </p:spTree>
     <p:extLst>
       <p:ext uri="{BB962C8B-B14F-4D97-AF65-F5344CB8AC3E}">
@@ -7434,7 +7801,7 @@
                             </p:stCondLst>
                             <p:childTnLst>
                               <p:par>
-                                <p:cTn id="5" presetID="1" presetClass="entr" presetSubtype="0" fill="hold" nodeType="clickEffect">
+                                <p:cTn id="5" presetID="1" presetClass="entr" presetSubtype="0" fill="hold" grpId="0" nodeType="clickEffect">
                                   <p:stCondLst>
                                     <p:cond delay="0"/>
                                   </p:stCondLst>
@@ -7447,7 +7814,34 @@
                                           </p:stCondLst>
                                         </p:cTn>
                                         <p:tgtEl>
-                                          <p:spTgt spid="8"/>
+                                          <p:spTgt spid="15"/>
+                                        </p:tgtEl>
+                                        <p:attrNameLst>
+                                          <p:attrName>style.visibility</p:attrName>
+                                        </p:attrNameLst>
+                                      </p:cBhvr>
+                                      <p:to>
+                                        <p:strVal val="visible"/>
+                                      </p:to>
+                                    </p:set>
+                                  </p:childTnLst>
+                                </p:cTn>
+                              </p:par>
+                              <p:par>
+                                <p:cTn id="7" presetID="1" presetClass="entr" presetSubtype="0" fill="hold" nodeType="withEffect">
+                                  <p:stCondLst>
+                                    <p:cond delay="0"/>
+                                  </p:stCondLst>
+                                  <p:childTnLst>
+                                    <p:set>
+                                      <p:cBhvr>
+                                        <p:cTn id="8" dur="1" fill="hold">
+                                          <p:stCondLst>
+                                            <p:cond delay="0"/>
+                                          </p:stCondLst>
+                                        </p:cTn>
+                                        <p:tgtEl>
+                                          <p:spTgt spid="17"/>
                                         </p:tgtEl>
                                         <p:attrNameLst>
                                           <p:attrName>style.visibility</p:attrName>
@@ -7467,46 +7861,19 @@
                     </p:cTn>
                   </p:par>
                   <p:par>
-                    <p:cTn id="7" fill="hold">
+                    <p:cTn id="9" fill="hold">
                       <p:stCondLst>
                         <p:cond delay="indefinite"/>
                       </p:stCondLst>
                       <p:childTnLst>
                         <p:par>
-                          <p:cTn id="8" fill="hold">
+                          <p:cTn id="10" fill="hold">
                             <p:stCondLst>
                               <p:cond delay="0"/>
                             </p:stCondLst>
                             <p:childTnLst>
                               <p:par>
-                                <p:cTn id="9" presetID="1" presetClass="entr" presetSubtype="0" fill="hold" grpId="0" nodeType="clickEffect">
-                                  <p:stCondLst>
-                                    <p:cond delay="0"/>
-                                  </p:stCondLst>
-                                  <p:childTnLst>
-                                    <p:set>
-                                      <p:cBhvr>
-                                        <p:cTn id="10" dur="1" fill="hold">
-                                          <p:stCondLst>
-                                            <p:cond delay="0"/>
-                                          </p:stCondLst>
-                                        </p:cTn>
-                                        <p:tgtEl>
-                                          <p:spTgt spid="12"/>
-                                        </p:tgtEl>
-                                        <p:attrNameLst>
-                                          <p:attrName>style.visibility</p:attrName>
-                                        </p:attrNameLst>
-                                      </p:cBhvr>
-                                      <p:to>
-                                        <p:strVal val="visible"/>
-                                      </p:to>
-                                    </p:set>
-                                  </p:childTnLst>
-                                </p:cTn>
-                              </p:par>
-                              <p:par>
-                                <p:cTn id="11" presetID="1" presetClass="entr" presetSubtype="0" fill="hold" grpId="0" nodeType="withEffect">
+                                <p:cTn id="11" presetID="1" presetClass="entr" presetSubtype="0" fill="hold" nodeType="clickEffect">
                                   <p:stCondLst>
                                     <p:cond delay="0"/>
                                   </p:stCondLst>
@@ -7519,7 +7886,7 @@
                                           </p:stCondLst>
                                         </p:cTn>
                                         <p:tgtEl>
-                                          <p:spTgt spid="11"/>
+                                          <p:spTgt spid="8"/>
                                         </p:tgtEl>
                                         <p:attrNameLst>
                                           <p:attrName>style.visibility</p:attrName>
@@ -7551,7 +7918,7 @@
                             </p:stCondLst>
                             <p:childTnLst>
                               <p:par>
-                                <p:cTn id="15" presetID="1" presetClass="entr" presetSubtype="0" fill="hold" nodeType="clickEffect">
+                                <p:cTn id="15" presetID="1" presetClass="entr" presetSubtype="0" fill="hold" grpId="0" nodeType="clickEffect">
                                   <p:stCondLst>
                                     <p:cond delay="0"/>
                                   </p:stCondLst>
@@ -7564,7 +7931,7 @@
                                           </p:stCondLst>
                                         </p:cTn>
                                         <p:tgtEl>
-                                          <p:spTgt spid="9"/>
+                                          <p:spTgt spid="12"/>
                                         </p:tgtEl>
                                         <p:attrNameLst>
                                           <p:attrName>style.visibility</p:attrName>
@@ -7586,6 +7953,78 @@
                                     <p:set>
                                       <p:cBhvr>
                                         <p:cTn id="18" dur="1" fill="hold">
+                                          <p:stCondLst>
+                                            <p:cond delay="0"/>
+                                          </p:stCondLst>
+                                        </p:cTn>
+                                        <p:tgtEl>
+                                          <p:spTgt spid="11"/>
+                                        </p:tgtEl>
+                                        <p:attrNameLst>
+                                          <p:attrName>style.visibility</p:attrName>
+                                        </p:attrNameLst>
+                                      </p:cBhvr>
+                                      <p:to>
+                                        <p:strVal val="visible"/>
+                                      </p:to>
+                                    </p:set>
+                                  </p:childTnLst>
+                                </p:cTn>
+                              </p:par>
+                            </p:childTnLst>
+                          </p:cTn>
+                        </p:par>
+                      </p:childTnLst>
+                    </p:cTn>
+                  </p:par>
+                  <p:par>
+                    <p:cTn id="19" fill="hold">
+                      <p:stCondLst>
+                        <p:cond delay="indefinite"/>
+                      </p:stCondLst>
+                      <p:childTnLst>
+                        <p:par>
+                          <p:cTn id="20" fill="hold">
+                            <p:stCondLst>
+                              <p:cond delay="0"/>
+                            </p:stCondLst>
+                            <p:childTnLst>
+                              <p:par>
+                                <p:cTn id="21" presetID="1" presetClass="entr" presetSubtype="0" fill="hold" nodeType="clickEffect">
+                                  <p:stCondLst>
+                                    <p:cond delay="0"/>
+                                  </p:stCondLst>
+                                  <p:childTnLst>
+                                    <p:set>
+                                      <p:cBhvr>
+                                        <p:cTn id="22" dur="1" fill="hold">
+                                          <p:stCondLst>
+                                            <p:cond delay="0"/>
+                                          </p:stCondLst>
+                                        </p:cTn>
+                                        <p:tgtEl>
+                                          <p:spTgt spid="9"/>
+                                        </p:tgtEl>
+                                        <p:attrNameLst>
+                                          <p:attrName>style.visibility</p:attrName>
+                                        </p:attrNameLst>
+                                      </p:cBhvr>
+                                      <p:to>
+                                        <p:strVal val="visible"/>
+                                      </p:to>
+                                    </p:set>
+                                  </p:childTnLst>
+                                </p:cTn>
+                              </p:par>
+                              <p:par>
+                                <p:cTn id="23" presetID="1" presetClass="entr" presetSubtype="0" fill="hold" grpId="0" nodeType="withEffect">
+                                  <p:stCondLst>
+                                    <p:cond delay="0"/>
+                                  </p:stCondLst>
+                                  <p:childTnLst>
+                                    <p:set>
+                                      <p:cBhvr>
+                                        <p:cTn id="24" dur="1" fill="hold">
                                           <p:stCondLst>
                                             <p:cond delay="0"/>
                                           </p:stCondLst>
@@ -7635,12 +8074,13 @@
       <p:bldP spid="11" grpId="0" animBg="1"/>
       <p:bldP spid="12" grpId="0"/>
       <p:bldP spid="13" grpId="0"/>
+      <p:bldP spid="15" grpId="0" animBg="1"/>
     </p:bldLst>
   </p:timing>
 </p:sld>
 </file>
 
-<file path=ppt/slides/slide14.xml><?xml version="1.0" encoding="utf-8"?>
+<file path=ppt/slides/slide15.xml><?xml version="1.0" encoding="utf-8"?>
 <p:sld xmlns:a="http://schemas.openxmlformats.org/drawingml/2006/main" xmlns:r="http://schemas.openxmlformats.org/officeDocument/2006/relationships" xmlns:p="http://schemas.openxmlformats.org/presentationml/2006/main">
   <p:cSld>
     <p:spTree>
@@ -7699,7 +8139,7 @@
 </p:sld>
 </file>
 
-<file path=ppt/slides/slide15.xml><?xml version="1.0" encoding="utf-8"?>
+<file path=ppt/slides/slide16.xml><?xml version="1.0" encoding="utf-8"?>
 <p:sld xmlns:a="http://schemas.openxmlformats.org/drawingml/2006/main" xmlns:r="http://schemas.openxmlformats.org/officeDocument/2006/relationships" xmlns:p="http://schemas.openxmlformats.org/presentationml/2006/main">
   <p:cSld>
     <p:spTree>
@@ -7759,7 +8199,7 @@
 </p:sld>
 </file>
 
-<file path=ppt/slides/slide16.xml><?xml version="1.0" encoding="utf-8"?>
+<file path=ppt/slides/slide17.xml><?xml version="1.0" encoding="utf-8"?>
 <p:sld xmlns:a="http://schemas.openxmlformats.org/drawingml/2006/main" xmlns:r="http://schemas.openxmlformats.org/officeDocument/2006/relationships" xmlns:p="http://schemas.openxmlformats.org/presentationml/2006/main">
   <p:cSld>
     <p:spTree>
@@ -8493,6 +8933,395 @@
         <p:cNvPr id="1" name="">
           <a:extLst>
             <a:ext uri="{FF2B5EF4-FFF2-40B4-BE49-F238E27FC236}">
+              <a16:creationId xmlns:a16="http://schemas.microsoft.com/office/drawing/2014/main" id="{AD6CAF47-E0A9-0366-4FB4-C17D3FE67039}"/>
+            </a:ext>
+          </a:extLst>
+        </p:cNvPr>
+        <p:cNvGrpSpPr/>
+        <p:nvPr/>
+      </p:nvGrpSpPr>
+      <p:grpSpPr>
+        <a:xfrm>
+          <a:off x="0" y="0"/>
+          <a:ext cx="0" cy="0"/>
+          <a:chOff x="0" y="0"/>
+          <a:chExt cx="0" cy="0"/>
+        </a:xfrm>
+      </p:grpSpPr>
+      <p:sp>
+        <p:nvSpPr>
+          <p:cNvPr id="2" name="Title 1">
+            <a:extLst>
+              <a:ext uri="{FF2B5EF4-FFF2-40B4-BE49-F238E27FC236}">
+                <a16:creationId xmlns:a16="http://schemas.microsoft.com/office/drawing/2014/main" id="{938FDC26-4570-5FE5-26BF-CA5D9429DE8D}"/>
+              </a:ext>
+            </a:extLst>
+          </p:cNvPr>
+          <p:cNvSpPr>
+            <a:spLocks noGrp="1"/>
+          </p:cNvSpPr>
+          <p:nvPr>
+            <p:ph type="title"/>
+          </p:nvPr>
+        </p:nvSpPr>
+        <p:spPr/>
+        <p:txBody>
+          <a:bodyPr/>
+          <a:lstStyle/>
+          <a:p>
+            <a:r>
+              <a:rPr lang="en-BE" dirty="0"/>
+              <a:t>Estimating the waiting times</a:t>
+            </a:r>
+          </a:p>
+        </p:txBody>
+      </p:sp>
+      <p:sp>
+        <p:nvSpPr>
+          <p:cNvPr id="3" name="Content Placeholder 2">
+            <a:extLst>
+              <a:ext uri="{FF2B5EF4-FFF2-40B4-BE49-F238E27FC236}">
+                <a16:creationId xmlns:a16="http://schemas.microsoft.com/office/drawing/2014/main" id="{9F523C1E-84DB-6E7C-6FA9-4553D0B0D541}"/>
+              </a:ext>
+            </a:extLst>
+          </p:cNvPr>
+          <p:cNvSpPr>
+            <a:spLocks noGrp="1"/>
+          </p:cNvSpPr>
+          <p:nvPr>
+            <p:ph idx="1"/>
+          </p:nvPr>
+        </p:nvSpPr>
+        <p:spPr/>
+        <p:txBody>
+          <a:bodyPr/>
+          <a:lstStyle/>
+          <a:p>
+            <a:endParaRPr lang="en-BE" dirty="0"/>
+          </a:p>
+          <a:p>
+            <a:endParaRPr lang="en-BE" dirty="0"/>
+          </a:p>
+          <a:p>
+            <a:endParaRPr lang="en-BE" dirty="0"/>
+          </a:p>
+        </p:txBody>
+      </p:sp>
+      <p:sp>
+        <p:nvSpPr>
+          <p:cNvPr id="4" name="Rounded Rectangle 3">
+            <a:extLst>
+              <a:ext uri="{FF2B5EF4-FFF2-40B4-BE49-F238E27FC236}">
+                <a16:creationId xmlns:a16="http://schemas.microsoft.com/office/drawing/2014/main" id="{3ECEA65C-89E3-FCA3-1C08-19F21D89E6D6}"/>
+              </a:ext>
+            </a:extLst>
+          </p:cNvPr>
+          <p:cNvSpPr/>
+          <p:nvPr/>
+        </p:nvSpPr>
+        <p:spPr>
+          <a:xfrm>
+            <a:off x="671513" y="2120900"/>
+            <a:ext cx="3128962" cy="3760788"/>
+          </a:xfrm>
+          <a:prstGeom prst="roundRect">
+            <a:avLst/>
+          </a:prstGeom>
+          <a:solidFill>
+            <a:schemeClr val="accent1">
+              <a:lumMod val="20000"/>
+              <a:lumOff val="80000"/>
+            </a:schemeClr>
+          </a:solidFill>
+          <a:ln>
+            <a:noFill/>
+          </a:ln>
+        </p:spPr>
+        <p:style>
+          <a:lnRef idx="2">
+            <a:schemeClr val="accent1">
+              <a:shade val="15000"/>
+            </a:schemeClr>
+          </a:lnRef>
+          <a:fillRef idx="1">
+            <a:schemeClr val="accent1"/>
+          </a:fillRef>
+          <a:effectRef idx="0">
+            <a:schemeClr val="accent1"/>
+          </a:effectRef>
+          <a:fontRef idx="minor">
+            <a:schemeClr val="lt1"/>
+          </a:fontRef>
+        </p:style>
+        <p:txBody>
+          <a:bodyPr rtlCol="0" anchor="ctr"/>
+          <a:lstStyle/>
+          <a:p>
+            <a:pPr algn="ctr"/>
+            <a:r>
+              <a:rPr lang="en-BE" dirty="0">
+                <a:solidFill>
+                  <a:schemeClr val="tx1"/>
+                </a:solidFill>
+              </a:rPr>
+              <a:t>Ratio actual over posted</a:t>
+            </a:r>
+          </a:p>
+        </p:txBody>
+      </p:sp>
+      <p:sp>
+        <p:nvSpPr>
+          <p:cNvPr id="5" name="Rounded Rectangle 4">
+            <a:extLst>
+              <a:ext uri="{FF2B5EF4-FFF2-40B4-BE49-F238E27FC236}">
+                <a16:creationId xmlns:a16="http://schemas.microsoft.com/office/drawing/2014/main" id="{42909BA4-83F4-E56D-183B-1F46CCB40D50}"/>
+              </a:ext>
+            </a:extLst>
+          </p:cNvPr>
+          <p:cNvSpPr/>
+          <p:nvPr/>
+        </p:nvSpPr>
+        <p:spPr>
+          <a:xfrm>
+            <a:off x="4531519" y="2120900"/>
+            <a:ext cx="3128962" cy="3760788"/>
+          </a:xfrm>
+          <a:prstGeom prst="roundRect">
+            <a:avLst/>
+          </a:prstGeom>
+          <a:solidFill>
+            <a:schemeClr val="accent3">
+              <a:lumMod val="20000"/>
+              <a:lumOff val="80000"/>
+            </a:schemeClr>
+          </a:solidFill>
+          <a:ln>
+            <a:noFill/>
+          </a:ln>
+        </p:spPr>
+        <p:style>
+          <a:lnRef idx="2">
+            <a:schemeClr val="accent1">
+              <a:shade val="15000"/>
+            </a:schemeClr>
+          </a:lnRef>
+          <a:fillRef idx="1">
+            <a:schemeClr val="accent1"/>
+          </a:fillRef>
+          <a:effectRef idx="0">
+            <a:schemeClr val="accent1"/>
+          </a:effectRef>
+          <a:fontRef idx="minor">
+            <a:schemeClr val="lt1"/>
+          </a:fontRef>
+        </p:style>
+        <p:txBody>
+          <a:bodyPr rtlCol="0" anchor="ctr"/>
+          <a:lstStyle/>
+          <a:p>
+            <a:pPr algn="ctr"/>
+            <a:r>
+              <a:rPr lang="en-BE" dirty="0">
+                <a:solidFill>
+                  <a:schemeClr val="tx1"/>
+                </a:solidFill>
+              </a:rPr>
+              <a:t>Predict ratios with model</a:t>
+            </a:r>
+          </a:p>
+        </p:txBody>
+      </p:sp>
+      <p:sp>
+        <p:nvSpPr>
+          <p:cNvPr id="6" name="Rounded Rectangle 5">
+            <a:extLst>
+              <a:ext uri="{FF2B5EF4-FFF2-40B4-BE49-F238E27FC236}">
+                <a16:creationId xmlns:a16="http://schemas.microsoft.com/office/drawing/2014/main" id="{0F284D33-DF28-7A86-7B8C-E79B949019A0}"/>
+              </a:ext>
+            </a:extLst>
+          </p:cNvPr>
+          <p:cNvSpPr/>
+          <p:nvPr/>
+        </p:nvSpPr>
+        <p:spPr>
+          <a:xfrm>
+            <a:off x="8391525" y="2120900"/>
+            <a:ext cx="3128962" cy="3760788"/>
+          </a:xfrm>
+          <a:prstGeom prst="roundRect">
+            <a:avLst/>
+          </a:prstGeom>
+          <a:solidFill>
+            <a:schemeClr val="accent2">
+              <a:lumMod val="20000"/>
+              <a:lumOff val="80000"/>
+            </a:schemeClr>
+          </a:solidFill>
+          <a:ln>
+            <a:noFill/>
+          </a:ln>
+        </p:spPr>
+        <p:style>
+          <a:lnRef idx="2">
+            <a:schemeClr val="accent1">
+              <a:shade val="15000"/>
+            </a:schemeClr>
+          </a:lnRef>
+          <a:fillRef idx="1">
+            <a:schemeClr val="accent1"/>
+          </a:fillRef>
+          <a:effectRef idx="0">
+            <a:schemeClr val="accent1"/>
+          </a:effectRef>
+          <a:fontRef idx="minor">
+            <a:schemeClr val="lt1"/>
+          </a:fontRef>
+        </p:style>
+        <p:txBody>
+          <a:bodyPr rtlCol="0" anchor="ctr"/>
+          <a:lstStyle/>
+          <a:p>
+            <a:pPr algn="ctr"/>
+            <a:r>
+              <a:rPr lang="en-BE" dirty="0">
+                <a:solidFill>
+                  <a:schemeClr val="tx1"/>
+                </a:solidFill>
+              </a:rPr>
+              <a:t>Estimate waiting times</a:t>
+            </a:r>
+          </a:p>
+        </p:txBody>
+      </p:sp>
+      <p:sp>
+        <p:nvSpPr>
+          <p:cNvPr id="8" name="Triangle 7">
+            <a:extLst>
+              <a:ext uri="{FF2B5EF4-FFF2-40B4-BE49-F238E27FC236}">
+                <a16:creationId xmlns:a16="http://schemas.microsoft.com/office/drawing/2014/main" id="{E15ECB88-4269-EBD4-81E2-87E4EEB1E8B6}"/>
+              </a:ext>
+            </a:extLst>
+          </p:cNvPr>
+          <p:cNvSpPr/>
+          <p:nvPr/>
+        </p:nvSpPr>
+        <p:spPr>
+          <a:xfrm rot="5400000">
+            <a:off x="3128424" y="3759817"/>
+            <a:ext cx="2075145" cy="482954"/>
+          </a:xfrm>
+          <a:prstGeom prst="triangle">
+            <a:avLst/>
+          </a:prstGeom>
+          <a:solidFill>
+            <a:schemeClr val="bg2">
+              <a:lumMod val="75000"/>
+            </a:schemeClr>
+          </a:solidFill>
+          <a:ln>
+            <a:noFill/>
+          </a:ln>
+        </p:spPr>
+        <p:style>
+          <a:lnRef idx="2">
+            <a:schemeClr val="accent1">
+              <a:shade val="15000"/>
+            </a:schemeClr>
+          </a:lnRef>
+          <a:fillRef idx="1">
+            <a:schemeClr val="accent1"/>
+          </a:fillRef>
+          <a:effectRef idx="0">
+            <a:schemeClr val="accent1"/>
+          </a:effectRef>
+          <a:fontRef idx="minor">
+            <a:schemeClr val="lt1"/>
+          </a:fontRef>
+        </p:style>
+        <p:txBody>
+          <a:bodyPr rtlCol="0" anchor="ctr"/>
+          <a:lstStyle/>
+          <a:p>
+            <a:pPr algn="ctr"/>
+            <a:endParaRPr lang="en-BE" dirty="0"/>
+          </a:p>
+        </p:txBody>
+      </p:sp>
+      <p:sp>
+        <p:nvSpPr>
+          <p:cNvPr id="10" name="Triangle 9">
+            <a:extLst>
+              <a:ext uri="{FF2B5EF4-FFF2-40B4-BE49-F238E27FC236}">
+                <a16:creationId xmlns:a16="http://schemas.microsoft.com/office/drawing/2014/main" id="{635722F7-ADA8-D880-47F8-388D822D76DF}"/>
+              </a:ext>
+            </a:extLst>
+          </p:cNvPr>
+          <p:cNvSpPr/>
+          <p:nvPr/>
+        </p:nvSpPr>
+        <p:spPr>
+          <a:xfrm rot="5400000">
+            <a:off x="6988430" y="3759817"/>
+            <a:ext cx="2075145" cy="482954"/>
+          </a:xfrm>
+          <a:prstGeom prst="triangle">
+            <a:avLst/>
+          </a:prstGeom>
+          <a:solidFill>
+            <a:schemeClr val="bg2">
+              <a:lumMod val="75000"/>
+            </a:schemeClr>
+          </a:solidFill>
+          <a:ln>
+            <a:noFill/>
+          </a:ln>
+        </p:spPr>
+        <p:style>
+          <a:lnRef idx="2">
+            <a:schemeClr val="accent1">
+              <a:shade val="15000"/>
+            </a:schemeClr>
+          </a:lnRef>
+          <a:fillRef idx="1">
+            <a:schemeClr val="accent1"/>
+          </a:fillRef>
+          <a:effectRef idx="0">
+            <a:schemeClr val="accent1"/>
+          </a:effectRef>
+          <a:fontRef idx="minor">
+            <a:schemeClr val="lt1"/>
+          </a:fontRef>
+        </p:style>
+        <p:txBody>
+          <a:bodyPr rtlCol="0" anchor="ctr"/>
+          <a:lstStyle/>
+          <a:p>
+            <a:pPr algn="ctr"/>
+            <a:endParaRPr lang="en-BE" dirty="0"/>
+          </a:p>
+        </p:txBody>
+      </p:sp>
+    </p:spTree>
+    <p:extLst>
+      <p:ext uri="{BB962C8B-B14F-4D97-AF65-F5344CB8AC3E}">
+        <p14:creationId xmlns:p14="http://schemas.microsoft.com/office/powerpoint/2010/main" val="2732536594"/>
+      </p:ext>
+    </p:extLst>
+  </p:cSld>
+  <p:clrMapOvr>
+    <a:masterClrMapping/>
+  </p:clrMapOvr>
+</p:sld>
+</file>
+
+<file path=ppt/slides/slide6.xml><?xml version="1.0" encoding="utf-8"?>
+<p:sld xmlns:a="http://schemas.openxmlformats.org/drawingml/2006/main" xmlns:r="http://schemas.openxmlformats.org/officeDocument/2006/relationships" xmlns:p="http://schemas.openxmlformats.org/presentationml/2006/main">
+  <p:cSld>
+    <p:spTree>
+      <p:nvGrpSpPr>
+        <p:cNvPr id="1" name="">
+          <a:extLst>
+            <a:ext uri="{FF2B5EF4-FFF2-40B4-BE49-F238E27FC236}">
               <a16:creationId xmlns:a16="http://schemas.microsoft.com/office/drawing/2014/main" id="{49653BAD-2D20-4EAE-136E-62FA2D1664C4}"/>
             </a:ext>
           </a:extLst>
@@ -8647,7 +9476,7 @@
 </p:sld>
 </file>
 
-<file path=ppt/slides/slide6.xml><?xml version="1.0" encoding="utf-8"?>
+<file path=ppt/slides/slide7.xml><?xml version="1.0" encoding="utf-8"?>
 <p:sld xmlns:a="http://schemas.openxmlformats.org/drawingml/2006/main" xmlns:r="http://schemas.openxmlformats.org/officeDocument/2006/relationships" xmlns:p="http://schemas.openxmlformats.org/presentationml/2006/main">
   <p:cSld>
     <p:spTree>
@@ -11211,7 +12040,7 @@
 </p:sld>
 </file>
 
-<file path=ppt/slides/slide7.xml><?xml version="1.0" encoding="utf-8"?>
+<file path=ppt/slides/slide8.xml><?xml version="1.0" encoding="utf-8"?>
 <p:sld xmlns:a="http://schemas.openxmlformats.org/drawingml/2006/main" xmlns:r="http://schemas.openxmlformats.org/officeDocument/2006/relationships" xmlns:p="http://schemas.openxmlformats.org/presentationml/2006/main">
   <p:cSld>
     <p:spTree>
@@ -13100,7 +13929,7 @@
 </p:sld>
 </file>
 
-<file path=ppt/slides/slide8.xml><?xml version="1.0" encoding="utf-8"?>
+<file path=ppt/slides/slide9.xml><?xml version="1.0" encoding="utf-8"?>
 <p:sld xmlns:a="http://schemas.openxmlformats.org/drawingml/2006/main" xmlns:r="http://schemas.openxmlformats.org/officeDocument/2006/relationships" xmlns:p="http://schemas.openxmlformats.org/presentationml/2006/main">
   <p:cSld>
     <p:spTree>
@@ -14805,279 +15634,6 @@
       <p:bldP spid="5" grpId="0" animBg="1"/>
     </p:bldLst>
   </p:timing>
-</p:sld>
-</file>
-
-<file path=ppt/slides/slide9.xml><?xml version="1.0" encoding="utf-8"?>
-<p:sld xmlns:a="http://schemas.openxmlformats.org/drawingml/2006/main" xmlns:r="http://schemas.openxmlformats.org/officeDocument/2006/relationships" xmlns:p="http://schemas.openxmlformats.org/presentationml/2006/main">
-  <p:cSld>
-    <p:spTree>
-      <p:nvGrpSpPr>
-        <p:cNvPr id="1" name="">
-          <a:extLst>
-            <a:ext uri="{FF2B5EF4-FFF2-40B4-BE49-F238E27FC236}">
-              <a16:creationId xmlns:a16="http://schemas.microsoft.com/office/drawing/2014/main" id="{9A366319-88FC-7D3A-1B58-E12CEB3C5B51}"/>
-            </a:ext>
-          </a:extLst>
-        </p:cNvPr>
-        <p:cNvGrpSpPr/>
-        <p:nvPr/>
-      </p:nvGrpSpPr>
-      <p:grpSpPr>
-        <a:xfrm>
-          <a:off x="0" y="0"/>
-          <a:ext cx="0" cy="0"/>
-          <a:chOff x="0" y="0"/>
-          <a:chExt cx="0" cy="0"/>
-        </a:xfrm>
-      </p:grpSpPr>
-      <p:sp>
-        <p:nvSpPr>
-          <p:cNvPr id="2" name="Title 1">
-            <a:extLst>
-              <a:ext uri="{FF2B5EF4-FFF2-40B4-BE49-F238E27FC236}">
-                <a16:creationId xmlns:a16="http://schemas.microsoft.com/office/drawing/2014/main" id="{ABC50D5E-AEE0-E054-831D-B16DF43E3E6A}"/>
-              </a:ext>
-            </a:extLst>
-          </p:cNvPr>
-          <p:cNvSpPr>
-            <a:spLocks noGrp="1"/>
-          </p:cNvSpPr>
-          <p:nvPr>
-            <p:ph type="title"/>
-          </p:nvPr>
-        </p:nvSpPr>
-        <p:spPr/>
-        <p:txBody>
-          <a:bodyPr/>
-          <a:lstStyle/>
-          <a:p>
-            <a:r>
-              <a:rPr lang="en-BE" dirty="0"/>
-              <a:t>Estimating the waiting times</a:t>
-            </a:r>
-          </a:p>
-        </p:txBody>
-      </p:sp>
-      <p:sp>
-        <p:nvSpPr>
-          <p:cNvPr id="3" name="Content Placeholder 2">
-            <a:extLst>
-              <a:ext uri="{FF2B5EF4-FFF2-40B4-BE49-F238E27FC236}">
-                <a16:creationId xmlns:a16="http://schemas.microsoft.com/office/drawing/2014/main" id="{F27E63B8-DA9C-5431-E1E5-FF46351E185A}"/>
-              </a:ext>
-            </a:extLst>
-          </p:cNvPr>
-          <p:cNvSpPr>
-            <a:spLocks noGrp="1"/>
-          </p:cNvSpPr>
-          <p:nvPr>
-            <p:ph idx="1"/>
-          </p:nvPr>
-        </p:nvSpPr>
-        <p:spPr/>
-        <p:txBody>
-          <a:bodyPr/>
-          <a:lstStyle/>
-          <a:p>
-            <a:endParaRPr lang="en-BE" dirty="0"/>
-          </a:p>
-          <a:p>
-            <a:endParaRPr lang="en-BE" dirty="0"/>
-          </a:p>
-          <a:p>
-            <a:endParaRPr lang="en-BE" dirty="0"/>
-          </a:p>
-        </p:txBody>
-      </p:sp>
-      <p:sp>
-        <p:nvSpPr>
-          <p:cNvPr id="4" name="Rounded Rectangle 3">
-            <a:extLst>
-              <a:ext uri="{FF2B5EF4-FFF2-40B4-BE49-F238E27FC236}">
-                <a16:creationId xmlns:a16="http://schemas.microsoft.com/office/drawing/2014/main" id="{96E28FE9-3A53-F6EF-76BA-06398A3BF7A0}"/>
-              </a:ext>
-            </a:extLst>
-          </p:cNvPr>
-          <p:cNvSpPr/>
-          <p:nvPr/>
-        </p:nvSpPr>
-        <p:spPr>
-          <a:xfrm>
-            <a:off x="671513" y="2120900"/>
-            <a:ext cx="3128962" cy="3760788"/>
-          </a:xfrm>
-          <a:prstGeom prst="roundRect">
-            <a:avLst/>
-          </a:prstGeom>
-          <a:solidFill>
-            <a:schemeClr val="accent1">
-              <a:lumMod val="20000"/>
-              <a:lumOff val="80000"/>
-            </a:schemeClr>
-          </a:solidFill>
-          <a:ln>
-            <a:noFill/>
-          </a:ln>
-        </p:spPr>
-        <p:style>
-          <a:lnRef idx="2">
-            <a:schemeClr val="accent1">
-              <a:shade val="15000"/>
-            </a:schemeClr>
-          </a:lnRef>
-          <a:fillRef idx="1">
-            <a:schemeClr val="accent1"/>
-          </a:fillRef>
-          <a:effectRef idx="0">
-            <a:schemeClr val="accent1"/>
-          </a:effectRef>
-          <a:fontRef idx="minor">
-            <a:schemeClr val="lt1"/>
-          </a:fontRef>
-        </p:style>
-        <p:txBody>
-          <a:bodyPr rtlCol="0" anchor="ctr"/>
-          <a:lstStyle/>
-          <a:p>
-            <a:pPr algn="ctr"/>
-            <a:r>
-              <a:rPr lang="en-BE" dirty="0">
-                <a:solidFill>
-                  <a:schemeClr val="tx1"/>
-                </a:solidFill>
-              </a:rPr>
-              <a:t>Ratio actual over posted</a:t>
-            </a:r>
-          </a:p>
-        </p:txBody>
-      </p:sp>
-      <p:sp>
-        <p:nvSpPr>
-          <p:cNvPr id="5" name="Rounded Rectangle 4">
-            <a:extLst>
-              <a:ext uri="{FF2B5EF4-FFF2-40B4-BE49-F238E27FC236}">
-                <a16:creationId xmlns:a16="http://schemas.microsoft.com/office/drawing/2014/main" id="{CFE63623-B0C2-7FCD-FCC6-2C35523E8443}"/>
-              </a:ext>
-            </a:extLst>
-          </p:cNvPr>
-          <p:cNvSpPr/>
-          <p:nvPr/>
-        </p:nvSpPr>
-        <p:spPr>
-          <a:xfrm>
-            <a:off x="4531519" y="2120900"/>
-            <a:ext cx="3128962" cy="3760788"/>
-          </a:xfrm>
-          <a:prstGeom prst="roundRect">
-            <a:avLst/>
-          </a:prstGeom>
-          <a:solidFill>
-            <a:schemeClr val="accent3">
-              <a:lumMod val="20000"/>
-              <a:lumOff val="80000"/>
-            </a:schemeClr>
-          </a:solidFill>
-          <a:ln>
-            <a:noFill/>
-          </a:ln>
-        </p:spPr>
-        <p:style>
-          <a:lnRef idx="2">
-            <a:schemeClr val="accent1">
-              <a:shade val="15000"/>
-            </a:schemeClr>
-          </a:lnRef>
-          <a:fillRef idx="1">
-            <a:schemeClr val="accent1"/>
-          </a:fillRef>
-          <a:effectRef idx="0">
-            <a:schemeClr val="accent1"/>
-          </a:effectRef>
-          <a:fontRef idx="minor">
-            <a:schemeClr val="lt1"/>
-          </a:fontRef>
-        </p:style>
-        <p:txBody>
-          <a:bodyPr rtlCol="0" anchor="ctr"/>
-          <a:lstStyle/>
-          <a:p>
-            <a:pPr algn="ctr"/>
-            <a:r>
-              <a:rPr lang="en-BE" dirty="0">
-                <a:solidFill>
-                  <a:schemeClr val="tx1"/>
-                </a:solidFill>
-              </a:rPr>
-              <a:t>Predict ratios with model</a:t>
-            </a:r>
-          </a:p>
-        </p:txBody>
-      </p:sp>
-      <p:sp>
-        <p:nvSpPr>
-          <p:cNvPr id="8" name="Triangle 7">
-            <a:extLst>
-              <a:ext uri="{FF2B5EF4-FFF2-40B4-BE49-F238E27FC236}">
-                <a16:creationId xmlns:a16="http://schemas.microsoft.com/office/drawing/2014/main" id="{8335E6CA-79BA-97ED-C3C0-49080C2ADC37}"/>
-              </a:ext>
-            </a:extLst>
-          </p:cNvPr>
-          <p:cNvSpPr/>
-          <p:nvPr/>
-        </p:nvSpPr>
-        <p:spPr>
-          <a:xfrm rot="5400000">
-            <a:off x="3128424" y="3759817"/>
-            <a:ext cx="2075145" cy="482954"/>
-          </a:xfrm>
-          <a:prstGeom prst="triangle">
-            <a:avLst/>
-          </a:prstGeom>
-          <a:solidFill>
-            <a:schemeClr val="bg2">
-              <a:lumMod val="75000"/>
-            </a:schemeClr>
-          </a:solidFill>
-          <a:ln>
-            <a:noFill/>
-          </a:ln>
-        </p:spPr>
-        <p:style>
-          <a:lnRef idx="2">
-            <a:schemeClr val="accent1">
-              <a:shade val="15000"/>
-            </a:schemeClr>
-          </a:lnRef>
-          <a:fillRef idx="1">
-            <a:schemeClr val="accent1"/>
-          </a:fillRef>
-          <a:effectRef idx="0">
-            <a:schemeClr val="accent1"/>
-          </a:effectRef>
-          <a:fontRef idx="minor">
-            <a:schemeClr val="lt1"/>
-          </a:fontRef>
-        </p:style>
-        <p:txBody>
-          <a:bodyPr rtlCol="0" anchor="ctr"/>
-          <a:lstStyle/>
-          <a:p>
-            <a:pPr algn="ctr"/>
-            <a:endParaRPr lang="en-BE" dirty="0"/>
-          </a:p>
-        </p:txBody>
-      </p:sp>
-    </p:spTree>
-    <p:extLst>
-      <p:ext uri="{BB962C8B-B14F-4D97-AF65-F5344CB8AC3E}">
-        <p14:creationId xmlns:p14="http://schemas.microsoft.com/office/powerpoint/2010/main" val="2694800230"/>
-      </p:ext>
-    </p:extLst>
-  </p:cSld>
-  <p:clrMapOvr>
-    <a:masterClrMapping/>
-  </p:clrMapOvr>
 </p:sld>
 </file>
 

</xml_diff>